<commit_message>
Subindo novos slides and materiais
</commit_message>
<xml_diff>
--- a/Visão Computacional/Aula 02 - Filtros e Extração de Características/Aula 02 - Filtros e Extração de Características.pptx
+++ b/Visão Computacional/Aula 02 - Filtros e Extração de Características/Aula 02 - Filtros e Extração de Características.pptx
@@ -30082,7 +30082,7 @@
         <p:spPr>
           <a:xfrm>
             <a:off x="200025" y="1689990"/>
-            <a:ext cx="9516375" cy="923330"/>
+            <a:ext cx="9516375" cy="1754326"/>
           </a:xfrm>
           <a:prstGeom prst="rect">
             <a:avLst/>
@@ -30114,6 +30114,75 @@
               </a:rPr>
               <a:t>[LINK]</a:t>
             </a:r>
+            <a:endParaRPr lang="en-US" dirty="0">
+              <a:latin typeface="Calibri" panose="020F0502020204030204" pitchFamily="34" charset="0"/>
+              <a:cs typeface="Calibri" panose="020F0502020204030204" pitchFamily="34" charset="0"/>
+            </a:endParaRPr>
+          </a:p>
+          <a:p>
+            <a:pPr marL="285750" indent="-285750">
+              <a:buFont typeface="Arial" panose="020B0604020202020204" pitchFamily="34" charset="0"/>
+              <a:buChar char="•"/>
+            </a:pPr>
+            <a:endParaRPr lang="en-US" dirty="0">
+              <a:latin typeface="Calibri" panose="020F0502020204030204" pitchFamily="34" charset="0"/>
+              <a:cs typeface="Calibri" panose="020F0502020204030204" pitchFamily="34" charset="0"/>
+            </a:endParaRPr>
+          </a:p>
+          <a:p>
+            <a:pPr marL="285750" indent="-285750">
+              <a:buFont typeface="Arial" panose="020B0604020202020204" pitchFamily="34" charset="0"/>
+              <a:buChar char="•"/>
+            </a:pPr>
+            <a:r>
+              <a:rPr lang="en-US" dirty="0" err="1">
+                <a:latin typeface="Calibri" panose="020F0502020204030204" pitchFamily="34" charset="0"/>
+                <a:cs typeface="Calibri" panose="020F0502020204030204" pitchFamily="34" charset="0"/>
+              </a:rPr>
+              <a:t>Avalie</a:t>
+            </a:r>
+            <a:r>
+              <a:rPr lang="en-US" dirty="0">
+                <a:latin typeface="Calibri" panose="020F0502020204030204" pitchFamily="34" charset="0"/>
+                <a:cs typeface="Calibri" panose="020F0502020204030204" pitchFamily="34" charset="0"/>
+              </a:rPr>
+              <a:t> o Professor!   </a:t>
+            </a:r>
+            <a:r>
+              <a:rPr lang="en-US" dirty="0">
+                <a:latin typeface="Calibri" panose="020F0502020204030204" pitchFamily="34" charset="0"/>
+                <a:cs typeface="Calibri" panose="020F0502020204030204" pitchFamily="34" charset="0"/>
+                <a:hlinkClick r:id="rId4"/>
+              </a:rPr>
+              <a:t>[LINK]</a:t>
+            </a:r>
+            <a:r>
+              <a:rPr lang="en-US" dirty="0">
+                <a:latin typeface="Calibri" panose="020F0502020204030204" pitchFamily="34" charset="0"/>
+                <a:cs typeface="Calibri" panose="020F0502020204030204" pitchFamily="34" charset="0"/>
+              </a:rPr>
+              <a:t>   </a:t>
+            </a:r>
+            <a:r>
+              <a:rPr lang="en-US" dirty="0" err="1">
+                <a:latin typeface="Calibri" panose="020F0502020204030204" pitchFamily="34" charset="0"/>
+                <a:cs typeface="Calibri" panose="020F0502020204030204" pitchFamily="34" charset="0"/>
+              </a:rPr>
+              <a:t>ou</a:t>
+            </a:r>
+            <a:r>
+              <a:rPr lang="en-US" dirty="0">
+                <a:latin typeface="Calibri" panose="020F0502020204030204" pitchFamily="34" charset="0"/>
+                <a:cs typeface="Calibri" panose="020F0502020204030204" pitchFamily="34" charset="0"/>
+              </a:rPr>
+              <a:t> QRCODE ABAIXO</a:t>
+            </a:r>
+          </a:p>
+          <a:p>
+            <a:pPr marL="285750" indent="-285750">
+              <a:buFont typeface="Arial" panose="020B0604020202020204" pitchFamily="34" charset="0"/>
+              <a:buChar char="•"/>
+            </a:pPr>
             <a:endParaRPr lang="en-US" dirty="0">
               <a:latin typeface="Calibri" panose="020F0502020204030204" pitchFamily="34" charset="0"/>
               <a:cs typeface="Calibri" panose="020F0502020204030204" pitchFamily="34" charset="0"/>
@@ -30276,6 +30345,36 @@
           </a:p>
         </p:txBody>
       </p:sp>
+      <p:pic>
+        <p:nvPicPr>
+          <p:cNvPr id="6" name="Imagem 5">
+            <a:extLst>
+              <a:ext uri="{FF2B5EF4-FFF2-40B4-BE49-F238E27FC236}">
+                <a16:creationId xmlns:a16="http://schemas.microsoft.com/office/drawing/2014/main" id="{A7B5AC89-EA95-9B34-1D7D-7666318A3C78}"/>
+              </a:ext>
+            </a:extLst>
+          </p:cNvPr>
+          <p:cNvPicPr>
+            <a:picLocks noChangeAspect="1"/>
+          </p:cNvPicPr>
+          <p:nvPr/>
+        </p:nvPicPr>
+        <p:blipFill>
+          <a:blip r:embed="rId5"/>
+          <a:stretch>
+            <a:fillRect/>
+          </a:stretch>
+        </p:blipFill>
+        <p:spPr>
+          <a:xfrm>
+            <a:off x="3363914" y="3110698"/>
+            <a:ext cx="3348572" cy="3207083"/>
+          </a:xfrm>
+          <a:prstGeom prst="rect">
+            <a:avLst/>
+          </a:prstGeom>
+        </p:spPr>
+      </p:pic>
     </p:spTree>
     <p:extLst>
       <p:ext uri="{BB962C8B-B14F-4D97-AF65-F5344CB8AC3E}">

</xml_diff>